<commit_message>
Fix presentation and add tz
</commit_message>
<xml_diff>
--- a/documentation/Presentation.pptx
+++ b/documentation/Presentation.pptx
@@ -3268,19 +3268,19 @@
               <a:tabLst/>
             </a:pPr>
             <a:r>
-              <a:rPr kumimoji="0" lang="ru-RU" altLang="ru-RU" sz="1800" b="1" i="0" u="none" strike="noStrike" cap="none" normalizeH="0" baseline="0" dirty="0" err="1" smtClean="0">
-                <a:ln>
-                  <a:noFill/>
-                </a:ln>
-                <a:solidFill>
-                  <a:schemeClr val="tx1"/>
-                </a:solidFill>
-                <a:effectLst/>
-              </a:rPr>
-              <a:t>Core</a:t>
-            </a:r>
-            <a:r>
-              <a:rPr kumimoji="0" lang="ru-RU" altLang="ru-RU" sz="1800" b="1" i="0" u="none" strike="noStrike" cap="none" normalizeH="0" baseline="0" dirty="0" smtClean="0">
+              <a:rPr kumimoji="0" lang="en-US" altLang="ru-RU" sz="1800" b="1" i="0" u="none" strike="noStrike" cap="none" normalizeH="0" baseline="0" dirty="0" smtClean="0">
+                <a:ln>
+                  <a:noFill/>
+                </a:ln>
+                <a:solidFill>
+                  <a:schemeClr val="tx1"/>
+                </a:solidFill>
+                <a:effectLst/>
+              </a:rPr>
+              <a:t>Main</a:t>
+            </a:r>
+            <a:r>
+              <a:rPr kumimoji="0" lang="en-US" altLang="ru-RU" sz="1800" b="1" i="0" u="none" strike="noStrike" cap="none" normalizeH="0" dirty="0" smtClean="0">
                 <a:ln>
                   <a:noFill/>
                 </a:ln>
@@ -3867,7 +3867,11 @@
             </a:pPr>
             <a:r>
               <a:rPr lang="en-US" sz="1800" dirty="0"/>
-              <a:t>Toroidal field: The game field wraps around. </a:t>
+              <a:t>Toroidal field: The game field wraps around</a:t>
+            </a:r>
+            <a:r>
+              <a:rPr lang="en-US" sz="1800" dirty="0" smtClean="0"/>
+              <a:t>.</a:t>
             </a:r>
             <a:endParaRPr lang="en-US" sz="1800" dirty="0" smtClean="0"/>
           </a:p>
@@ -3888,7 +3892,11 @@
             </a:r>
             <a:r>
               <a:rPr lang="en-US" sz="1800" dirty="0"/>
-              <a:t>rules: Users can change the rules for cell birth (born) and survival (survive). </a:t>
+              <a:t>rules: Users can change the rules for cell birth (born) and survival (survive</a:t>
+            </a:r>
+            <a:r>
+              <a:rPr lang="en-US" sz="1800" dirty="0" smtClean="0"/>
+              <a:t>).</a:t>
             </a:r>
             <a:endParaRPr lang="en-US" sz="1800" dirty="0" smtClean="0"/>
           </a:p>
@@ -3909,7 +3917,11 @@
             </a:r>
             <a:r>
               <a:rPr lang="en-US" sz="1800" dirty="0"/>
-              <a:t>changes: Ability to change the state of field cells at any point during simulation. </a:t>
+              <a:t>changes: Ability to change the state of field cells at any point during simulation</a:t>
+            </a:r>
+            <a:r>
+              <a:rPr lang="en-US" sz="1800" dirty="0" smtClean="0"/>
+              <a:t>.</a:t>
             </a:r>
             <a:endParaRPr lang="en-US" sz="1800" dirty="0" smtClean="0"/>
           </a:p>
@@ -3930,20 +3942,21 @@
             </a:r>
             <a:r>
               <a:rPr lang="en-US" sz="1800" dirty="0"/>
-              <a:t>: Control via keyboard commands, output of messages and errors to the terminal.</a:t>
-            </a:r>
-            <a:r>
-              <a:rPr kumimoji="0" lang="ru-RU" altLang="ru-RU" sz="1800" b="0" i="0" u="none" strike="noStrike" cap="none" normalizeH="0" baseline="0" dirty="0" smtClean="0">
-                <a:ln>
-                  <a:noFill/>
-                </a:ln>
-                <a:solidFill>
-                  <a:schemeClr val="tx1"/>
-                </a:solidFill>
-                <a:effectLst/>
-              </a:rPr>
-              <a:t> </a:t>
-            </a:r>
+              <a:t>: Control via keyboard commands, output of messages and errors to the terminal</a:t>
+            </a:r>
+            <a:r>
+              <a:rPr lang="en-US" sz="1800" dirty="0" smtClean="0"/>
+              <a:t>.</a:t>
+            </a:r>
+            <a:endParaRPr kumimoji="0" lang="ru-RU" altLang="ru-RU" sz="1800" b="0" i="0" u="none" strike="noStrike" cap="none" normalizeH="0" baseline="0" dirty="0" smtClean="0">
+              <a:ln>
+                <a:noFill/>
+              </a:ln>
+              <a:solidFill>
+                <a:schemeClr val="tx1"/>
+              </a:solidFill>
+              <a:effectLst/>
+            </a:endParaRPr>
           </a:p>
         </p:txBody>
       </p:sp>
@@ -4079,7 +4092,11 @@
             </a:pPr>
             <a:r>
               <a:rPr lang="en-US" sz="1800" dirty="0"/>
-              <a:t>Processor: CdM-16 based on von Neumann architecture. </a:t>
+              <a:t>Processor: CdM-16 based on von Neumann architecture</a:t>
+            </a:r>
+            <a:r>
+              <a:rPr lang="en-US" sz="1800" dirty="0" smtClean="0"/>
+              <a:t>.</a:t>
             </a:r>
             <a:endParaRPr lang="ru-RU" sz="1800" dirty="0" smtClean="0"/>
           </a:p>
@@ -4116,7 +4133,11 @@
             </a:r>
             <a:r>
               <a:rPr lang="en-US" sz="1800" dirty="0"/>
-              <a:t> (for software). </a:t>
+              <a:t> (for software</a:t>
+            </a:r>
+            <a:r>
+              <a:rPr lang="en-US" sz="1800" dirty="0" smtClean="0"/>
+              <a:t>).</a:t>
             </a:r>
             <a:endParaRPr lang="ru-RU" sz="1800" dirty="0" smtClean="0"/>
           </a:p>
@@ -4137,7 +4158,11 @@
             </a:r>
             <a:r>
               <a:rPr lang="en-US" sz="1800" dirty="0"/>
-              <a:t>: Keyboard for commands, terminal for display. </a:t>
+              <a:t>: Keyboard for commands, terminal for display</a:t>
+            </a:r>
+            <a:r>
+              <a:rPr lang="en-US" sz="1800" dirty="0" smtClean="0"/>
+              <a:t>.</a:t>
             </a:r>
             <a:endParaRPr lang="ru-RU" sz="1800" dirty="0" smtClean="0"/>
           </a:p>
@@ -4166,7 +4191,11 @@
             </a:r>
             <a:r>
               <a:rPr lang="en-US" sz="1800" dirty="0"/>
-              <a:t> for calculations, display (32x32) for visualization.</a:t>
+              <a:t> for calculations, display (32x32) for </a:t>
+            </a:r>
+            <a:r>
+              <a:rPr lang="en-US" sz="1800" dirty="0" smtClean="0"/>
+              <a:t>visualization.</a:t>
             </a:r>
             <a:endParaRPr kumimoji="0" lang="ru-RU" altLang="ru-RU" sz="1800" b="0" i="0" u="none" strike="noStrike" cap="none" normalizeH="0" baseline="0" dirty="0" smtClean="0">
               <a:ln>
@@ -4367,7 +4396,11 @@
             </a:r>
             <a:r>
               <a:rPr lang="en-US" sz="1800" dirty="0"/>
-              <a:t>(ready) are sent to the handler. </a:t>
+              <a:t>(ready) are sent to the handler</a:t>
+            </a:r>
+            <a:r>
+              <a:rPr lang="en-US" sz="1800" dirty="0" smtClean="0"/>
+              <a:t>.</a:t>
             </a:r>
             <a:endParaRPr lang="ru-RU" sz="1800" dirty="0" smtClean="0"/>
           </a:p>
@@ -4385,7 +4418,11 @@
             </a:r>
             <a:r>
               <a:rPr lang="en-US" sz="1800" dirty="0"/>
-              <a:t>: Displays entered characters and system messages. </a:t>
+              <a:t>: Displays entered characters and system messages</a:t>
+            </a:r>
+            <a:r>
+              <a:rPr lang="en-US" sz="1800" dirty="0" smtClean="0"/>
+              <a:t>.</a:t>
             </a:r>
             <a:endParaRPr lang="ru-RU" sz="1800" dirty="0" smtClean="0"/>
           </a:p>
@@ -4419,7 +4456,11 @@
             </a:r>
             <a:r>
               <a:rPr lang="en-US" sz="1800" dirty="0"/>
-              <a:t>bus and the terminal.</a:t>
+              <a:t>bus and the </a:t>
+            </a:r>
+            <a:r>
+              <a:rPr lang="en-US" sz="1800" dirty="0" smtClean="0"/>
+              <a:t>terminal.</a:t>
             </a:r>
             <a:endParaRPr kumimoji="0" lang="ru-RU" altLang="ru-RU" sz="1800" b="0" i="0" u="none" strike="noStrike" cap="none" normalizeH="0" baseline="0" dirty="0" smtClean="0">
               <a:ln>
@@ -4510,7 +4551,6 @@
               <a:rPr lang="en-US" b="1" dirty="0"/>
               <a:t>Hardware Part: Processing and Control</a:t>
             </a:r>
-            <a:endParaRPr lang="en-US" b="1" dirty="0"/>
           </a:p>
         </p:txBody>
       </p:sp>
@@ -4592,7 +4632,11 @@
             </a:r>
             <a:r>
               <a:rPr lang="en-US" sz="1800" dirty="0"/>
-              <a:t> via memory-mapped I/O. </a:t>
+              <a:t> via memory-mapped I/O</a:t>
+            </a:r>
+            <a:r>
+              <a:rPr lang="en-US" sz="1800" dirty="0" smtClean="0"/>
+              <a:t>.</a:t>
             </a:r>
             <a:endParaRPr lang="ru-RU" sz="1800" dirty="0" smtClean="0"/>
           </a:p>
@@ -4610,7 +4654,11 @@
             </a:r>
             <a:r>
               <a:rPr lang="en-US" sz="1800" dirty="0"/>
-              <a:t>registers: Special memory addresses (0x04-0x12) for game control (start/stop, rules, cell updates, reset). </a:t>
+              <a:t>registers: Special memory addresses (0x04-0x12) for game control (start/stop, rules, cell updates, reset</a:t>
+            </a:r>
+            <a:r>
+              <a:rPr lang="en-US" sz="1800" dirty="0" smtClean="0"/>
+              <a:t>).</a:t>
             </a:r>
             <a:endParaRPr lang="ru-RU" sz="1800" dirty="0" smtClean="0"/>
           </a:p>
@@ -4753,7 +4801,6 @@
               <a:rPr lang="en-US" b="1" dirty="0"/>
               <a:t>and Cell Structure</a:t>
             </a:r>
-            <a:endParaRPr lang="en-US" b="1" dirty="0"/>
           </a:p>
         </p:txBody>
       </p:sp>
@@ -4835,7 +4882,11 @@
             </a:r>
             <a:r>
               <a:rPr lang="en-US" sz="1800" dirty="0"/>
-              <a:t> consists of 32 "line" sub-circuits, each responsible for a field row. They exchange neighbor data (up/down). </a:t>
+              <a:t> consists of 32 "line" sub-circuits, each responsible for a field row. They exchange neighbor data (up/down</a:t>
+            </a:r>
+            <a:r>
+              <a:rPr lang="en-US" sz="1800" dirty="0" smtClean="0"/>
+              <a:t>).</a:t>
             </a:r>
             <a:endParaRPr lang="ru-RU" sz="1800" dirty="0" smtClean="0"/>
           </a:p>
@@ -4853,7 +4904,11 @@
             </a:r>
             <a:r>
               <a:rPr lang="en-US" sz="1800" dirty="0"/>
-              <a:t>Cell" Structure: Each "line" contains 32 "cell" sub-circuits. </a:t>
+              <a:t>Cell" Structure: Each "line" contains 32 "cell" sub-circuits</a:t>
+            </a:r>
+            <a:r>
+              <a:rPr lang="en-US" sz="1800" dirty="0" smtClean="0"/>
+              <a:t>.</a:t>
             </a:r>
             <a:endParaRPr lang="ru-RU" sz="1800" dirty="0" smtClean="0"/>
           </a:p>
@@ -4978,7 +5033,6 @@
               <a:rPr lang="en-US" b="1" dirty="0"/>
               <a:t>Software Part: Basics</a:t>
             </a:r>
-            <a:endParaRPr lang="en-US" b="1" dirty="0"/>
           </a:p>
         </p:txBody>
       </p:sp>
@@ -5052,7 +5106,11 @@
             </a:pPr>
             <a:r>
               <a:rPr lang="en-US" sz="1800" dirty="0"/>
-              <a:t>Entry point (_start): Initializes the stack, enables keyboard interrupts (ISTATE flag), outputs the "&gt; " prompt, and starts the main loop. </a:t>
+              <a:t>Entry point (_start): Initializes the stack, enables keyboard interrupts (ISTATE flag), outputs the "&gt; " prompt, and starts the main loop</a:t>
+            </a:r>
+            <a:r>
+              <a:rPr lang="en-US" sz="1800" dirty="0" smtClean="0"/>
+              <a:t>.</a:t>
             </a:r>
             <a:endParaRPr lang="ru-RU" sz="1800" dirty="0" smtClean="0"/>
           </a:p>
@@ -5078,7 +5136,11 @@
             </a:r>
             <a:r>
               <a:rPr lang="en-US" sz="1800" dirty="0"/>
-              <a:t>. If the flag is set (command entered), calls the command parser. </a:t>
+              <a:t>. If the flag is set (command entered), calls the command parser</a:t>
+            </a:r>
+            <a:r>
+              <a:rPr lang="en-US" sz="1800" dirty="0" smtClean="0"/>
+              <a:t>.</a:t>
             </a:r>
             <a:endParaRPr lang="ru-RU" sz="1800" dirty="0" smtClean="0"/>
           </a:p>
@@ -5112,7 +5174,11 @@
             </a:r>
             <a:r>
               <a:rPr lang="en-US" sz="1800" dirty="0"/>
-              <a:t> when Enter is pressed.</a:t>
+              <a:t> when Enter is </a:t>
+            </a:r>
+            <a:r>
+              <a:rPr lang="en-US" sz="1800" dirty="0" smtClean="0"/>
+              <a:t>pressed.</a:t>
             </a:r>
             <a:endParaRPr kumimoji="0" lang="ru-RU" altLang="ru-RU" sz="1800" b="0" i="0" u="none" strike="noStrike" cap="none" normalizeH="0" baseline="0" dirty="0" smtClean="0">
               <a:ln>
@@ -5241,7 +5307,6 @@
               <a:rPr lang="en-US" b="1" dirty="0"/>
               <a:t>Software Part: Command Processing</a:t>
             </a:r>
-            <a:endParaRPr lang="en-US" b="1" dirty="0"/>
           </a:p>
         </p:txBody>
       </p:sp>
@@ -5323,7 +5388,11 @@
             </a:r>
             <a:r>
               <a:rPr lang="en-US" sz="1800" dirty="0"/>
-              <a:t> -&gt; parse()): Reads the string from the circular buffer, extracts the command name and arguments. </a:t>
+              <a:t> -&gt; parse()): Reads the string from the circular buffer, extracts the command name and arguments</a:t>
+            </a:r>
+            <a:r>
+              <a:rPr lang="en-US" sz="1800" dirty="0" smtClean="0"/>
+              <a:t>.</a:t>
             </a:r>
             <a:endParaRPr lang="en-US" sz="1800" dirty="0" smtClean="0"/>
           </a:p>
@@ -5349,7 +5418,11 @@
             </a:r>
             <a:r>
               <a:rPr lang="en-US" sz="1800" dirty="0"/>
-              <a:t>()): Splits the string into individual arguments by spaces. </a:t>
+              <a:t>()): Splits the string into individual arguments by spaces</a:t>
+            </a:r>
+            <a:r>
+              <a:rPr lang="en-US" sz="1800" dirty="0" smtClean="0"/>
+              <a:t>.</a:t>
             </a:r>
             <a:endParaRPr lang="en-US" sz="1800" dirty="0" smtClean="0"/>
           </a:p>
@@ -5367,7 +5440,11 @@
             </a:r>
             <a:r>
               <a:rPr lang="en-US" sz="1800" dirty="0"/>
-              <a:t>Call: The command name is compared against a list of known commands. The corresponding handler function (Wrapper) is called. </a:t>
+              <a:t>Call: The command name is compared against a list of known commands. The corresponding handler function (Wrapper) is called</a:t>
+            </a:r>
+            <a:r>
+              <a:rPr lang="en-US" sz="1800" dirty="0" smtClean="0"/>
+              <a:t>.</a:t>
             </a:r>
             <a:endParaRPr lang="en-US" sz="1800" dirty="0" smtClean="0"/>
           </a:p>
@@ -6371,6 +6448,35 @@
 </file>
 
 <file path=customXml/item1.xml><?xml version="1.0" encoding="utf-8"?>
+<?mso-contentType ?>
+<FormTemplates xmlns="http://schemas.microsoft.com/sharepoint/v3/contenttype/forms">
+  <Display>DocumentLibraryForm</Display>
+  <Edit>DocumentLibraryForm</Edit>
+  <New>DocumentLibraryForm</New>
+</FormTemplates>
+</file>
+
+<file path=customXml/item2.xml><?xml version="1.0" encoding="utf-8"?>
+<p:properties xmlns:p="http://schemas.microsoft.com/office/2006/metadata/properties" xmlns:xsi="http://www.w3.org/2001/XMLSchema-instance" xmlns:pc="http://schemas.microsoft.com/office/infopath/2007/PartnerControls">
+  <documentManagement>
+    <Background xmlns="71af3243-3dd4-4a8d-8c0d-dd76da1f02a5">false</Background>
+    <Status xmlns="71af3243-3dd4-4a8d-8c0d-dd76da1f02a5">Not started</Status>
+    <_ip_UnifiedCompliancePolicyUIAction xmlns="http://schemas.microsoft.com/sharepoint/v3" xsi:nil="true"/>
+    <Image xmlns="71af3243-3dd4-4a8d-8c0d-dd76da1f02a5">
+      <Url xsi:nil="true"/>
+      <Description xsi:nil="true"/>
+    </Image>
+    <_ip_UnifiedCompliancePolicyProperties xmlns="http://schemas.microsoft.com/sharepoint/v3" xsi:nil="true"/>
+    <ImageTagsTaxHTField xmlns="71af3243-3dd4-4a8d-8c0d-dd76da1f02a5">
+      <Terms xmlns="http://schemas.microsoft.com/office/infopath/2007/PartnerControls"/>
+    </ImageTagsTaxHTField>
+    <TaxCatchAll xmlns="230e9df3-be65-4c73-a93b-d1236ebd677e" xsi:nil="true"/>
+    <MediaServiceKeyPoints xmlns="71af3243-3dd4-4a8d-8c0d-dd76da1f02a5" xsi:nil="true"/>
+  </documentManagement>
+</p:properties>
+</file>
+
+<file path=customXml/item3.xml><?xml version="1.0" encoding="utf-8"?>
 <ct:contentTypeSchema xmlns:ct="http://schemas.microsoft.com/office/2006/metadata/contentType" xmlns:ma="http://schemas.microsoft.com/office/2006/metadata/properties/metaAttributes" ct:_="" ma:_="" ma:contentTypeName="Document" ma:contentTypeID="0x01010079F111ED35F8CC479449609E8A0923A6" ma:contentTypeVersion="28" ma:contentTypeDescription="Create a new document." ma:contentTypeScope="" ma:versionID="60f5a4f2d2b0abadcf532d48ebf9cb71">
   <xsd:schema xmlns:xsd="http://www.w3.org/2001/XMLSchema" xmlns:xs="http://www.w3.org/2001/XMLSchema" xmlns:p="http://schemas.microsoft.com/office/2006/metadata/properties" xmlns:ns1="http://schemas.microsoft.com/sharepoint/v3" xmlns:ns2="71af3243-3dd4-4a8d-8c0d-dd76da1f02a5" xmlns:ns3="16c05727-aa75-4e4a-9b5f-8a80a1165891" xmlns:ns4="230e9df3-be65-4c73-a93b-d1236ebd677e" targetNamespace="http://schemas.microsoft.com/office/2006/metadata/properties" ma:root="true" ma:fieldsID="7dd78129e6a1811f84807ad11c651531" ns1:_="" ns2:_="" ns3:_="" ns4:_="">
     <xsd:import namespace="http://schemas.microsoft.com/sharepoint/v3"/>
@@ -6682,36 +6788,27 @@
 </ct:contentTypeSchema>
 </file>
 
-<file path=customXml/item2.xml><?xml version="1.0" encoding="utf-8"?>
-<p:properties xmlns:p="http://schemas.microsoft.com/office/2006/metadata/properties" xmlns:xsi="http://www.w3.org/2001/XMLSchema-instance" xmlns:pc="http://schemas.microsoft.com/office/infopath/2007/PartnerControls">
-  <documentManagement>
-    <Background xmlns="71af3243-3dd4-4a8d-8c0d-dd76da1f02a5">false</Background>
-    <Status xmlns="71af3243-3dd4-4a8d-8c0d-dd76da1f02a5">Not started</Status>
-    <_ip_UnifiedCompliancePolicyUIAction xmlns="http://schemas.microsoft.com/sharepoint/v3" xsi:nil="true"/>
-    <Image xmlns="71af3243-3dd4-4a8d-8c0d-dd76da1f02a5">
-      <Url xsi:nil="true"/>
-      <Description xsi:nil="true"/>
-    </Image>
-    <_ip_UnifiedCompliancePolicyProperties xmlns="http://schemas.microsoft.com/sharepoint/v3" xsi:nil="true"/>
-    <ImageTagsTaxHTField xmlns="71af3243-3dd4-4a8d-8c0d-dd76da1f02a5">
-      <Terms xmlns="http://schemas.microsoft.com/office/infopath/2007/PartnerControls"/>
-    </ImageTagsTaxHTField>
-    <TaxCatchAll xmlns="230e9df3-be65-4c73-a93b-d1236ebd677e" xsi:nil="true"/>
-    <MediaServiceKeyPoints xmlns="71af3243-3dd4-4a8d-8c0d-dd76da1f02a5" xsi:nil="true"/>
-  </documentManagement>
-</p:properties>
+<file path=customXml/itemProps1.xml><?xml version="1.0" encoding="utf-8"?>
+<ds:datastoreItem xmlns:ds="http://schemas.openxmlformats.org/officeDocument/2006/customXml" ds:itemID="{6FB6FBE4-5ACD-4115-9139-635E82C3D35A}">
+  <ds:schemaRefs>
+    <ds:schemaRef ds:uri="http://schemas.microsoft.com/sharepoint/v3/contenttype/forms"/>
+  </ds:schemaRefs>
+</ds:datastoreItem>
 </file>
 
-<file path=customXml/item3.xml><?xml version="1.0" encoding="utf-8"?>
-<?mso-contentType ?>
-<FormTemplates xmlns="http://schemas.microsoft.com/sharepoint/v3/contenttype/forms">
-  <Display>DocumentLibraryForm</Display>
-  <Edit>DocumentLibraryForm</Edit>
-  <New>DocumentLibraryForm</New>
-</FormTemplates>
+<file path=customXml/itemProps2.xml><?xml version="1.0" encoding="utf-8"?>
+<ds:datastoreItem xmlns:ds="http://schemas.openxmlformats.org/officeDocument/2006/customXml" ds:itemID="{A7EFEE82-03DD-4F90-81E2-2AF29E1D81FB}">
+  <ds:schemaRefs>
+    <ds:schemaRef ds:uri="http://schemas.microsoft.com/office/2006/metadata/properties"/>
+    <ds:schemaRef ds:uri="http://schemas.microsoft.com/office/infopath/2007/PartnerControls"/>
+    <ds:schemaRef ds:uri="71af3243-3dd4-4a8d-8c0d-dd76da1f02a5"/>
+    <ds:schemaRef ds:uri="http://schemas.microsoft.com/sharepoint/v3"/>
+    <ds:schemaRef ds:uri="230e9df3-be65-4c73-a93b-d1236ebd677e"/>
+  </ds:schemaRefs>
+</ds:datastoreItem>
 </file>
 
-<file path=customXml/itemProps1.xml><?xml version="1.0" encoding="utf-8"?>
+<file path=customXml/itemProps3.xml><?xml version="1.0" encoding="utf-8"?>
 <ds:datastoreItem xmlns:ds="http://schemas.openxmlformats.org/officeDocument/2006/customXml" ds:itemID="{D0C6F549-03FF-4828-9BD8-8F40C0A2B2BD}">
   <ds:schemaRefs>
     <ds:schemaRef ds:uri="http://schemas.microsoft.com/office/2006/metadata/contentType"/>
@@ -6732,26 +6829,6 @@
 </ds:datastoreItem>
 </file>
 
-<file path=customXml/itemProps2.xml><?xml version="1.0" encoding="utf-8"?>
-<ds:datastoreItem xmlns:ds="http://schemas.openxmlformats.org/officeDocument/2006/customXml" ds:itemID="{A7EFEE82-03DD-4F90-81E2-2AF29E1D81FB}">
-  <ds:schemaRefs>
-    <ds:schemaRef ds:uri="http://schemas.microsoft.com/office/2006/metadata/properties"/>
-    <ds:schemaRef ds:uri="http://schemas.microsoft.com/office/infopath/2007/PartnerControls"/>
-    <ds:schemaRef ds:uri="71af3243-3dd4-4a8d-8c0d-dd76da1f02a5"/>
-    <ds:schemaRef ds:uri="http://schemas.microsoft.com/sharepoint/v3"/>
-    <ds:schemaRef ds:uri="230e9df3-be65-4c73-a93b-d1236ebd677e"/>
-  </ds:schemaRefs>
-</ds:datastoreItem>
-</file>
-
-<file path=customXml/itemProps3.xml><?xml version="1.0" encoding="utf-8"?>
-<ds:datastoreItem xmlns:ds="http://schemas.openxmlformats.org/officeDocument/2006/customXml" ds:itemID="{6FB6FBE4-5ACD-4115-9139-635E82C3D35A}">
-  <ds:schemaRefs>
-    <ds:schemaRef ds:uri="http://schemas.microsoft.com/sharepoint/v3/contenttype/forms"/>
-  </ds:schemaRefs>
-</ds:datastoreItem>
-</file>
-
 <file path=docMetadata/LabelInfo.xml><?xml version="1.0" encoding="utf-8"?>
 <clbl:labelList xmlns:clbl="http://schemas.microsoft.com/office/2020/mipLabelMetadata"/>
 </file>
</xml_diff>